<commit_message>
Add notes and demos for Wednesday
</commit_message>
<xml_diff>
--- a/notes/diagrams.pptx
+++ b/notes/diagrams.pptx
@@ -10,6 +10,9 @@
     <p:sldId id="258" r:id="rId4"/>
     <p:sldId id="259" r:id="rId5"/>
     <p:sldId id="260" r:id="rId6"/>
+    <p:sldId id="261" r:id="rId7"/>
+    <p:sldId id="262" r:id="rId8"/>
+    <p:sldId id="263" r:id="rId9"/>
   </p:sldIdLst>
   <p:sldSz cx="12192000" cy="6858000"/>
   <p:notesSz cx="6858000" cy="9144000"/>
@@ -108,6 +111,11 @@
       </a:defRPr>
     </a:lvl9pPr>
   </p:defaultTextStyle>
+  <p:extLst>
+    <p:ext uri="{EFAFB233-063F-42B5-8137-9DF3F51BA10A}">
+      <p15:sldGuideLst xmlns:p15="http://schemas.microsoft.com/office/powerpoint/2012/main"/>
+    </p:ext>
+  </p:extLst>
 </p:presentation>
 </file>
 
@@ -258,7 +266,7 @@
           <a:p>
             <a:fld id="{F727E16F-4A15-461D-9B68-73BD12FBB2C2}" type="datetimeFigureOut">
               <a:rPr lang="en-US" smtClean="0"/>
-              <a:t>2/8/2021</a:t>
+              <a:t>2/10/2021</a:t>
             </a:fld>
             <a:endParaRPr lang="en-US"/>
           </a:p>
@@ -456,7 +464,7 @@
           <a:p>
             <a:fld id="{F727E16F-4A15-461D-9B68-73BD12FBB2C2}" type="datetimeFigureOut">
               <a:rPr lang="en-US" smtClean="0"/>
-              <a:t>2/8/2021</a:t>
+              <a:t>2/10/2021</a:t>
             </a:fld>
             <a:endParaRPr lang="en-US"/>
           </a:p>
@@ -664,7 +672,7 @@
           <a:p>
             <a:fld id="{F727E16F-4A15-461D-9B68-73BD12FBB2C2}" type="datetimeFigureOut">
               <a:rPr lang="en-US" smtClean="0"/>
-              <a:t>2/8/2021</a:t>
+              <a:t>2/10/2021</a:t>
             </a:fld>
             <a:endParaRPr lang="en-US"/>
           </a:p>
@@ -862,7 +870,7 @@
           <a:p>
             <a:fld id="{F727E16F-4A15-461D-9B68-73BD12FBB2C2}" type="datetimeFigureOut">
               <a:rPr lang="en-US" smtClean="0"/>
-              <a:t>2/8/2021</a:t>
+              <a:t>2/10/2021</a:t>
             </a:fld>
             <a:endParaRPr lang="en-US"/>
           </a:p>
@@ -1137,7 +1145,7 @@
           <a:p>
             <a:fld id="{F727E16F-4A15-461D-9B68-73BD12FBB2C2}" type="datetimeFigureOut">
               <a:rPr lang="en-US" smtClean="0"/>
-              <a:t>2/8/2021</a:t>
+              <a:t>2/10/2021</a:t>
             </a:fld>
             <a:endParaRPr lang="en-US"/>
           </a:p>
@@ -1402,7 +1410,7 @@
           <a:p>
             <a:fld id="{F727E16F-4A15-461D-9B68-73BD12FBB2C2}" type="datetimeFigureOut">
               <a:rPr lang="en-US" smtClean="0"/>
-              <a:t>2/8/2021</a:t>
+              <a:t>2/10/2021</a:t>
             </a:fld>
             <a:endParaRPr lang="en-US"/>
           </a:p>
@@ -1814,7 +1822,7 @@
           <a:p>
             <a:fld id="{F727E16F-4A15-461D-9B68-73BD12FBB2C2}" type="datetimeFigureOut">
               <a:rPr lang="en-US" smtClean="0"/>
-              <a:t>2/8/2021</a:t>
+              <a:t>2/10/2021</a:t>
             </a:fld>
             <a:endParaRPr lang="en-US"/>
           </a:p>
@@ -1955,7 +1963,7 @@
           <a:p>
             <a:fld id="{F727E16F-4A15-461D-9B68-73BD12FBB2C2}" type="datetimeFigureOut">
               <a:rPr lang="en-US" smtClean="0"/>
-              <a:t>2/8/2021</a:t>
+              <a:t>2/10/2021</a:t>
             </a:fld>
             <a:endParaRPr lang="en-US"/>
           </a:p>
@@ -2068,7 +2076,7 @@
           <a:p>
             <a:fld id="{F727E16F-4A15-461D-9B68-73BD12FBB2C2}" type="datetimeFigureOut">
               <a:rPr lang="en-US" smtClean="0"/>
-              <a:t>2/8/2021</a:t>
+              <a:t>2/10/2021</a:t>
             </a:fld>
             <a:endParaRPr lang="en-US"/>
           </a:p>
@@ -2379,7 +2387,7 @@
           <a:p>
             <a:fld id="{F727E16F-4A15-461D-9B68-73BD12FBB2C2}" type="datetimeFigureOut">
               <a:rPr lang="en-US" smtClean="0"/>
-              <a:t>2/8/2021</a:t>
+              <a:t>2/10/2021</a:t>
             </a:fld>
             <a:endParaRPr lang="en-US"/>
           </a:p>
@@ -2667,7 +2675,7 @@
           <a:p>
             <a:fld id="{F727E16F-4A15-461D-9B68-73BD12FBB2C2}" type="datetimeFigureOut">
               <a:rPr lang="en-US" smtClean="0"/>
-              <a:t>2/8/2021</a:t>
+              <a:t>2/10/2021</a:t>
             </a:fld>
             <a:endParaRPr lang="en-US"/>
           </a:p>
@@ -2908,7 +2916,7 @@
           <a:p>
             <a:fld id="{F727E16F-4A15-461D-9B68-73BD12FBB2C2}" type="datetimeFigureOut">
               <a:rPr lang="en-US" smtClean="0"/>
-              <a:t>2/8/2021</a:t>
+              <a:t>2/10/2021</a:t>
             </a:fld>
             <a:endParaRPr lang="en-US"/>
           </a:p>
@@ -5910,6 +5918,1378 @@
 </p:sld>
 </file>
 
+<file path=ppt/slides/slide6.xml><?xml version="1.0" encoding="utf-8"?>
+<p:sld xmlns:a="http://schemas.openxmlformats.org/drawingml/2006/main" xmlns:r="http://schemas.openxmlformats.org/officeDocument/2006/relationships" xmlns:p="http://schemas.openxmlformats.org/presentationml/2006/main">
+  <p:cSld>
+    <p:spTree>
+      <p:nvGrpSpPr>
+        <p:cNvPr id="1" name=""/>
+        <p:cNvGrpSpPr/>
+        <p:nvPr/>
+      </p:nvGrpSpPr>
+      <p:grpSpPr>
+        <a:xfrm>
+          <a:off x="0" y="0"/>
+          <a:ext cx="0" cy="0"/>
+          <a:chOff x="0" y="0"/>
+          <a:chExt cx="0" cy="0"/>
+        </a:xfrm>
+      </p:grpSpPr>
+      <p:sp>
+        <p:nvSpPr>
+          <p:cNvPr id="4" name="Rectangle 3">
+            <a:extLst>
+              <a:ext uri="{FF2B5EF4-FFF2-40B4-BE49-F238E27FC236}">
+                <a16:creationId xmlns:a16="http://schemas.microsoft.com/office/drawing/2014/main" id="{5976747F-2E21-4913-937B-BCAC438BDBE8}"/>
+              </a:ext>
+            </a:extLst>
+          </p:cNvPr>
+          <p:cNvSpPr/>
+          <p:nvPr/>
+        </p:nvSpPr>
+        <p:spPr>
+          <a:xfrm>
+            <a:off x="1459684" y="3489820"/>
+            <a:ext cx="2298584" cy="3020037"/>
+          </a:xfrm>
+          <a:prstGeom prst="rect">
+            <a:avLst/>
+          </a:prstGeom>
+        </p:spPr>
+        <p:style>
+          <a:lnRef idx="2">
+            <a:schemeClr val="accent1">
+              <a:shade val="50000"/>
+            </a:schemeClr>
+          </a:lnRef>
+          <a:fillRef idx="1">
+            <a:schemeClr val="accent1"/>
+          </a:fillRef>
+          <a:effectRef idx="0">
+            <a:schemeClr val="accent1"/>
+          </a:effectRef>
+          <a:fontRef idx="minor">
+            <a:schemeClr val="lt1"/>
+          </a:fontRef>
+        </p:style>
+        <p:txBody>
+          <a:bodyPr rtlCol="0" anchor="t"/>
+          <a:lstStyle/>
+          <a:p>
+            <a:pPr algn="ctr"/>
+            <a:r>
+              <a:rPr lang="en-US" dirty="0"/>
+              <a:t>Call Stack</a:t>
+            </a:r>
+          </a:p>
+        </p:txBody>
+      </p:sp>
+      <p:sp>
+        <p:nvSpPr>
+          <p:cNvPr id="5" name="Rectangle 4">
+            <a:extLst>
+              <a:ext uri="{FF2B5EF4-FFF2-40B4-BE49-F238E27FC236}">
+                <a16:creationId xmlns:a16="http://schemas.microsoft.com/office/drawing/2014/main" id="{83739E83-3CBD-4BCA-A977-C2E3611580C0}"/>
+              </a:ext>
+            </a:extLst>
+          </p:cNvPr>
+          <p:cNvSpPr/>
+          <p:nvPr/>
+        </p:nvSpPr>
+        <p:spPr>
+          <a:xfrm>
+            <a:off x="1661020" y="5788404"/>
+            <a:ext cx="1812022" cy="545284"/>
+          </a:xfrm>
+          <a:prstGeom prst="rect">
+            <a:avLst/>
+          </a:prstGeom>
+        </p:spPr>
+        <p:style>
+          <a:lnRef idx="2">
+            <a:schemeClr val="accent2">
+              <a:shade val="50000"/>
+            </a:schemeClr>
+          </a:lnRef>
+          <a:fillRef idx="1">
+            <a:schemeClr val="accent2"/>
+          </a:fillRef>
+          <a:effectRef idx="0">
+            <a:schemeClr val="accent2"/>
+          </a:effectRef>
+          <a:fontRef idx="minor">
+            <a:schemeClr val="lt1"/>
+          </a:fontRef>
+        </p:style>
+        <p:txBody>
+          <a:bodyPr rtlCol="0" anchor="ctr"/>
+          <a:lstStyle/>
+          <a:p>
+            <a:pPr algn="ctr"/>
+            <a:r>
+              <a:rPr lang="en-US" dirty="0"/>
+              <a:t>main() </a:t>
+            </a:r>
+          </a:p>
+        </p:txBody>
+      </p:sp>
+      <p:sp>
+        <p:nvSpPr>
+          <p:cNvPr id="7" name="Rectangle 6">
+            <a:extLst>
+              <a:ext uri="{FF2B5EF4-FFF2-40B4-BE49-F238E27FC236}">
+                <a16:creationId xmlns:a16="http://schemas.microsoft.com/office/drawing/2014/main" id="{AD385D05-C634-49D5-B651-F220F1DB6008}"/>
+              </a:ext>
+            </a:extLst>
+          </p:cNvPr>
+          <p:cNvSpPr/>
+          <p:nvPr/>
+        </p:nvSpPr>
+        <p:spPr>
+          <a:xfrm>
+            <a:off x="1661020" y="4454554"/>
+            <a:ext cx="1812022" cy="1257650"/>
+          </a:xfrm>
+          <a:prstGeom prst="rect">
+            <a:avLst/>
+          </a:prstGeom>
+        </p:spPr>
+        <p:style>
+          <a:lnRef idx="2">
+            <a:schemeClr val="accent2">
+              <a:shade val="50000"/>
+            </a:schemeClr>
+          </a:lnRef>
+          <a:fillRef idx="1">
+            <a:schemeClr val="accent2"/>
+          </a:fillRef>
+          <a:effectRef idx="0">
+            <a:schemeClr val="accent2"/>
+          </a:effectRef>
+          <a:fontRef idx="minor">
+            <a:schemeClr val="lt1"/>
+          </a:fontRef>
+        </p:style>
+        <p:txBody>
+          <a:bodyPr rtlCol="0" anchor="ctr"/>
+          <a:lstStyle/>
+          <a:p>
+            <a:pPr algn="ctr"/>
+            <a:r>
+              <a:rPr lang="en-US" dirty="0"/>
+              <a:t>demo() </a:t>
+            </a:r>
+          </a:p>
+        </p:txBody>
+      </p:sp>
+      <p:sp>
+        <p:nvSpPr>
+          <p:cNvPr id="8" name="Rectangle 7">
+            <a:extLst>
+              <a:ext uri="{FF2B5EF4-FFF2-40B4-BE49-F238E27FC236}">
+                <a16:creationId xmlns:a16="http://schemas.microsoft.com/office/drawing/2014/main" id="{635C8A21-9884-4099-A3B0-542CBF2D8DAD}"/>
+              </a:ext>
+            </a:extLst>
+          </p:cNvPr>
+          <p:cNvSpPr/>
+          <p:nvPr/>
+        </p:nvSpPr>
+        <p:spPr>
+          <a:xfrm>
+            <a:off x="3758268" y="511728"/>
+            <a:ext cx="6769915" cy="3548544"/>
+          </a:xfrm>
+          <a:prstGeom prst="rect">
+            <a:avLst/>
+          </a:prstGeom>
+        </p:spPr>
+        <p:style>
+          <a:lnRef idx="2">
+            <a:schemeClr val="accent1">
+              <a:shade val="50000"/>
+            </a:schemeClr>
+          </a:lnRef>
+          <a:fillRef idx="1">
+            <a:schemeClr val="accent1"/>
+          </a:fillRef>
+          <a:effectRef idx="0">
+            <a:schemeClr val="accent1"/>
+          </a:effectRef>
+          <a:fontRef idx="minor">
+            <a:schemeClr val="lt1"/>
+          </a:fontRef>
+        </p:style>
+        <p:txBody>
+          <a:bodyPr rtlCol="0" anchor="ctr"/>
+          <a:lstStyle/>
+          <a:p>
+            <a:pPr algn="ctr"/>
+            <a:r>
+              <a:rPr lang="en-US"/>
+              <a:t>Heap</a:t>
+            </a:r>
+            <a:endParaRPr lang="en-US" dirty="0"/>
+          </a:p>
+        </p:txBody>
+      </p:sp>
+      <p:sp>
+        <p:nvSpPr>
+          <p:cNvPr id="9" name="Rectangle 8">
+            <a:extLst>
+              <a:ext uri="{FF2B5EF4-FFF2-40B4-BE49-F238E27FC236}">
+                <a16:creationId xmlns:a16="http://schemas.microsoft.com/office/drawing/2014/main" id="{B0543A52-FB02-42F8-8ECE-2D674620C3D4}"/>
+              </a:ext>
+            </a:extLst>
+          </p:cNvPr>
+          <p:cNvSpPr/>
+          <p:nvPr/>
+        </p:nvSpPr>
+        <p:spPr>
+          <a:xfrm>
+            <a:off x="8237989" y="612396"/>
+            <a:ext cx="2223083" cy="973123"/>
+          </a:xfrm>
+          <a:prstGeom prst="rect">
+            <a:avLst/>
+          </a:prstGeom>
+        </p:spPr>
+        <p:style>
+          <a:lnRef idx="2">
+            <a:schemeClr val="accent4">
+              <a:shade val="50000"/>
+            </a:schemeClr>
+          </a:lnRef>
+          <a:fillRef idx="1">
+            <a:schemeClr val="accent4"/>
+          </a:fillRef>
+          <a:effectRef idx="0">
+            <a:schemeClr val="accent4"/>
+          </a:effectRef>
+          <a:fontRef idx="minor">
+            <a:schemeClr val="lt1"/>
+          </a:fontRef>
+        </p:style>
+        <p:txBody>
+          <a:bodyPr rtlCol="0" anchor="ctr"/>
+          <a:lstStyle/>
+          <a:p>
+            <a:pPr algn="ctr"/>
+            <a:r>
+              <a:rPr lang="en-US" dirty="0"/>
+              <a:t>String Pool</a:t>
+            </a:r>
+          </a:p>
+        </p:txBody>
+      </p:sp>
+      <p:sp>
+        <p:nvSpPr>
+          <p:cNvPr id="10" name="TextBox 9">
+            <a:extLst>
+              <a:ext uri="{FF2B5EF4-FFF2-40B4-BE49-F238E27FC236}">
+                <a16:creationId xmlns:a16="http://schemas.microsoft.com/office/drawing/2014/main" id="{FA6663D4-77BE-46A6-A09D-AB7DD008B697}"/>
+              </a:ext>
+            </a:extLst>
+          </p:cNvPr>
+          <p:cNvSpPr txBox="1"/>
+          <p:nvPr/>
+        </p:nvSpPr>
+        <p:spPr>
+          <a:xfrm>
+            <a:off x="8196045" y="612396"/>
+            <a:ext cx="1065402" cy="369332"/>
+          </a:xfrm>
+          <a:prstGeom prst="rect">
+            <a:avLst/>
+          </a:prstGeom>
+          <a:noFill/>
+        </p:spPr>
+        <p:txBody>
+          <a:bodyPr wrap="square" rtlCol="0">
+            <a:spAutoFit/>
+          </a:bodyPr>
+          <a:lstStyle/>
+          <a:p>
+            <a:r>
+              <a:rPr lang="en-US" dirty="0"/>
+              <a:t>“hello”</a:t>
+            </a:r>
+          </a:p>
+        </p:txBody>
+      </p:sp>
+      <p:sp>
+        <p:nvSpPr>
+          <p:cNvPr id="11" name="TextBox 10">
+            <a:extLst>
+              <a:ext uri="{FF2B5EF4-FFF2-40B4-BE49-F238E27FC236}">
+                <a16:creationId xmlns:a16="http://schemas.microsoft.com/office/drawing/2014/main" id="{F4899541-3206-4202-A670-785BB86F4E17}"/>
+              </a:ext>
+            </a:extLst>
+          </p:cNvPr>
+          <p:cNvSpPr txBox="1"/>
+          <p:nvPr/>
+        </p:nvSpPr>
+        <p:spPr>
+          <a:xfrm>
+            <a:off x="9559255" y="149974"/>
+            <a:ext cx="1782661" cy="1200329"/>
+          </a:xfrm>
+          <a:prstGeom prst="rect">
+            <a:avLst/>
+          </a:prstGeom>
+          <a:noFill/>
+        </p:spPr>
+        <p:txBody>
+          <a:bodyPr wrap="square" rtlCol="0">
+            <a:spAutoFit/>
+          </a:bodyPr>
+          <a:lstStyle/>
+          <a:p>
+            <a:r>
+              <a:rPr lang="en-US" sz="1800" dirty="0">
+                <a:solidFill>
+                  <a:srgbClr val="2A00FF"/>
+                </a:solidFill>
+                <a:latin typeface="Consolas" panose="020B0609020204030204" pitchFamily="49" charset="0"/>
+              </a:rPr>
+              <a:t>"Max value that an integer can have: "</a:t>
+            </a:r>
+            <a:endParaRPr lang="en-US" dirty="0"/>
+          </a:p>
+        </p:txBody>
+      </p:sp>
+      <p:sp>
+        <p:nvSpPr>
+          <p:cNvPr id="13" name="TextBox 12">
+            <a:extLst>
+              <a:ext uri="{FF2B5EF4-FFF2-40B4-BE49-F238E27FC236}">
+                <a16:creationId xmlns:a16="http://schemas.microsoft.com/office/drawing/2014/main" id="{F7250992-09EE-465D-80EA-72EDEFDFDBB0}"/>
+              </a:ext>
+            </a:extLst>
+          </p:cNvPr>
+          <p:cNvSpPr txBox="1"/>
+          <p:nvPr/>
+        </p:nvSpPr>
+        <p:spPr>
+          <a:xfrm>
+            <a:off x="8888136" y="142613"/>
+            <a:ext cx="1342239" cy="1754326"/>
+          </a:xfrm>
+          <a:prstGeom prst="rect">
+            <a:avLst/>
+          </a:prstGeom>
+          <a:noFill/>
+        </p:spPr>
+        <p:txBody>
+          <a:bodyPr wrap="square" rtlCol="0">
+            <a:spAutoFit/>
+          </a:bodyPr>
+          <a:lstStyle/>
+          <a:p>
+            <a:r>
+              <a:rPr lang="en-US" sz="1800" dirty="0">
+                <a:solidFill>
+                  <a:srgbClr val="2A00FF"/>
+                </a:solidFill>
+                <a:latin typeface="Consolas" panose="020B0609020204030204" pitchFamily="49" charset="0"/>
+              </a:rPr>
+              <a:t>"Min value that an integer can have: "</a:t>
+            </a:r>
+            <a:endParaRPr lang="en-US" dirty="0"/>
+          </a:p>
+        </p:txBody>
+      </p:sp>
+      <p:sp>
+        <p:nvSpPr>
+          <p:cNvPr id="14" name="TextBox 13">
+            <a:extLst>
+              <a:ext uri="{FF2B5EF4-FFF2-40B4-BE49-F238E27FC236}">
+                <a16:creationId xmlns:a16="http://schemas.microsoft.com/office/drawing/2014/main" id="{63CC7567-E2BD-4814-AFA4-EB80CF296452}"/>
+              </a:ext>
+            </a:extLst>
+          </p:cNvPr>
+          <p:cNvSpPr txBox="1"/>
+          <p:nvPr/>
+        </p:nvSpPr>
+        <p:spPr>
+          <a:xfrm>
+            <a:off x="1954635" y="4597167"/>
+            <a:ext cx="796954" cy="369332"/>
+          </a:xfrm>
+          <a:prstGeom prst="rect">
+            <a:avLst/>
+          </a:prstGeom>
+          <a:noFill/>
+        </p:spPr>
+        <p:txBody>
+          <a:bodyPr wrap="square" rtlCol="0">
+            <a:spAutoFit/>
+          </a:bodyPr>
+          <a:lstStyle/>
+          <a:p>
+            <a:r>
+              <a:rPr lang="en-US" dirty="0" err="1"/>
+              <a:t>myStr</a:t>
+            </a:r>
+            <a:endParaRPr lang="en-US" dirty="0"/>
+          </a:p>
+        </p:txBody>
+      </p:sp>
+      <p:sp>
+        <p:nvSpPr>
+          <p:cNvPr id="15" name="TextBox 14">
+            <a:extLst>
+              <a:ext uri="{FF2B5EF4-FFF2-40B4-BE49-F238E27FC236}">
+                <a16:creationId xmlns:a16="http://schemas.microsoft.com/office/drawing/2014/main" id="{4ADE091C-1851-4A0C-A583-9FEC97031AB4}"/>
+              </a:ext>
+            </a:extLst>
+          </p:cNvPr>
+          <p:cNvSpPr txBox="1"/>
+          <p:nvPr/>
+        </p:nvSpPr>
+        <p:spPr>
+          <a:xfrm>
+            <a:off x="2592198" y="4673367"/>
+            <a:ext cx="964734" cy="369332"/>
+          </a:xfrm>
+          <a:prstGeom prst="rect">
+            <a:avLst/>
+          </a:prstGeom>
+          <a:noFill/>
+        </p:spPr>
+        <p:txBody>
+          <a:bodyPr wrap="square" rtlCol="0">
+            <a:spAutoFit/>
+          </a:bodyPr>
+          <a:lstStyle/>
+          <a:p>
+            <a:r>
+              <a:rPr lang="en-US" dirty="0"/>
+              <a:t>myStr2</a:t>
+            </a:r>
+          </a:p>
+        </p:txBody>
+      </p:sp>
+      <p:cxnSp>
+        <p:nvCxnSpPr>
+          <p:cNvPr id="17" name="Straight Arrow Connector 16">
+            <a:extLst>
+              <a:ext uri="{FF2B5EF4-FFF2-40B4-BE49-F238E27FC236}">
+                <a16:creationId xmlns:a16="http://schemas.microsoft.com/office/drawing/2014/main" id="{C5113ED4-7DF1-405F-985D-F0B99C19D822}"/>
+              </a:ext>
+            </a:extLst>
+          </p:cNvPr>
+          <p:cNvCxnSpPr>
+            <a:stCxn id="14" idx="0"/>
+          </p:cNvCxnSpPr>
+          <p:nvPr/>
+        </p:nvCxnSpPr>
+        <p:spPr>
+          <a:xfrm flipV="1">
+            <a:off x="2353112" y="864066"/>
+            <a:ext cx="6077824" cy="3733101"/>
+          </a:xfrm>
+          <a:prstGeom prst="straightConnector1">
+            <a:avLst/>
+          </a:prstGeom>
+          <a:ln>
+            <a:tailEnd type="triangle"/>
+          </a:ln>
+        </p:spPr>
+        <p:style>
+          <a:lnRef idx="1">
+            <a:schemeClr val="dk1"/>
+          </a:lnRef>
+          <a:fillRef idx="0">
+            <a:schemeClr val="dk1"/>
+          </a:fillRef>
+          <a:effectRef idx="0">
+            <a:schemeClr val="dk1"/>
+          </a:effectRef>
+          <a:fontRef idx="minor">
+            <a:schemeClr val="tx1"/>
+          </a:fontRef>
+        </p:style>
+      </p:cxnSp>
+      <p:cxnSp>
+        <p:nvCxnSpPr>
+          <p:cNvPr id="18" name="Straight Arrow Connector 17">
+            <a:extLst>
+              <a:ext uri="{FF2B5EF4-FFF2-40B4-BE49-F238E27FC236}">
+                <a16:creationId xmlns:a16="http://schemas.microsoft.com/office/drawing/2014/main" id="{5E58CF12-3063-4A1D-85B8-FC6FA1F903E7}"/>
+              </a:ext>
+            </a:extLst>
+          </p:cNvPr>
+          <p:cNvCxnSpPr>
+            <a:cxnSpLocks/>
+          </p:cNvCxnSpPr>
+          <p:nvPr/>
+        </p:nvCxnSpPr>
+        <p:spPr>
+          <a:xfrm flipV="1">
+            <a:off x="3141676" y="864066"/>
+            <a:ext cx="5331204" cy="3868941"/>
+          </a:xfrm>
+          <a:prstGeom prst="straightConnector1">
+            <a:avLst/>
+          </a:prstGeom>
+          <a:ln>
+            <a:tailEnd type="triangle"/>
+          </a:ln>
+        </p:spPr>
+        <p:style>
+          <a:lnRef idx="1">
+            <a:schemeClr val="dk1"/>
+          </a:lnRef>
+          <a:fillRef idx="0">
+            <a:schemeClr val="dk1"/>
+          </a:fillRef>
+          <a:effectRef idx="0">
+            <a:schemeClr val="dk1"/>
+          </a:effectRef>
+          <a:fontRef idx="minor">
+            <a:schemeClr val="tx1"/>
+          </a:fontRef>
+        </p:style>
+      </p:cxnSp>
+      <p:sp>
+        <p:nvSpPr>
+          <p:cNvPr id="21" name="TextBox 20">
+            <a:extLst>
+              <a:ext uri="{FF2B5EF4-FFF2-40B4-BE49-F238E27FC236}">
+                <a16:creationId xmlns:a16="http://schemas.microsoft.com/office/drawing/2014/main" id="{50CD4B07-6630-4DDC-9E47-81FA7136F07A}"/>
+              </a:ext>
+            </a:extLst>
+          </p:cNvPr>
+          <p:cNvSpPr txBox="1"/>
+          <p:nvPr/>
+        </p:nvSpPr>
+        <p:spPr>
+          <a:xfrm>
+            <a:off x="2143387" y="5286926"/>
+            <a:ext cx="964734" cy="369332"/>
+          </a:xfrm>
+          <a:prstGeom prst="rect">
+            <a:avLst/>
+          </a:prstGeom>
+          <a:noFill/>
+        </p:spPr>
+        <p:txBody>
+          <a:bodyPr wrap="square">
+            <a:spAutoFit/>
+          </a:bodyPr>
+          <a:lstStyle/>
+          <a:p>
+            <a:r>
+              <a:rPr lang="en-US" dirty="0"/>
+              <a:t>myStr3</a:t>
+            </a:r>
+          </a:p>
+        </p:txBody>
+      </p:sp>
+      <p:sp>
+        <p:nvSpPr>
+          <p:cNvPr id="22" name="TextBox 21">
+            <a:extLst>
+              <a:ext uri="{FF2B5EF4-FFF2-40B4-BE49-F238E27FC236}">
+                <a16:creationId xmlns:a16="http://schemas.microsoft.com/office/drawing/2014/main" id="{79823AD0-1918-4D1C-B7F6-6E2B8AD56E61}"/>
+              </a:ext>
+            </a:extLst>
+          </p:cNvPr>
+          <p:cNvSpPr txBox="1"/>
+          <p:nvPr/>
+        </p:nvSpPr>
+        <p:spPr>
+          <a:xfrm>
+            <a:off x="4320330" y="1182848"/>
+            <a:ext cx="1317072" cy="1200329"/>
+          </a:xfrm>
+          <a:prstGeom prst="rect">
+            <a:avLst/>
+          </a:prstGeom>
+          <a:noFill/>
+        </p:spPr>
+        <p:txBody>
+          <a:bodyPr wrap="square" rtlCol="0">
+            <a:spAutoFit/>
+          </a:bodyPr>
+          <a:lstStyle/>
+          <a:p>
+            <a:r>
+              <a:rPr lang="en-US" dirty="0"/>
+              <a:t>String Object with value “hello”</a:t>
+            </a:r>
+          </a:p>
+        </p:txBody>
+      </p:sp>
+      <p:cxnSp>
+        <p:nvCxnSpPr>
+          <p:cNvPr id="24" name="Straight Arrow Connector 23">
+            <a:extLst>
+              <a:ext uri="{FF2B5EF4-FFF2-40B4-BE49-F238E27FC236}">
+                <a16:creationId xmlns:a16="http://schemas.microsoft.com/office/drawing/2014/main" id="{5A30C158-516A-4359-BB54-9AC36064BE45}"/>
+              </a:ext>
+            </a:extLst>
+          </p:cNvPr>
+          <p:cNvCxnSpPr/>
+          <p:nvPr/>
+        </p:nvCxnSpPr>
+        <p:spPr>
+          <a:xfrm flipV="1">
+            <a:off x="2961314" y="1896939"/>
+            <a:ext cx="1551963" cy="3547516"/>
+          </a:xfrm>
+          <a:prstGeom prst="straightConnector1">
+            <a:avLst/>
+          </a:prstGeom>
+          <a:ln>
+            <a:tailEnd type="triangle"/>
+          </a:ln>
+        </p:spPr>
+        <p:style>
+          <a:lnRef idx="1">
+            <a:schemeClr val="dk1"/>
+          </a:lnRef>
+          <a:fillRef idx="0">
+            <a:schemeClr val="dk1"/>
+          </a:fillRef>
+          <a:effectRef idx="0">
+            <a:schemeClr val="dk1"/>
+          </a:effectRef>
+          <a:fontRef idx="minor">
+            <a:schemeClr val="tx1"/>
+          </a:fontRef>
+        </p:style>
+      </p:cxnSp>
+    </p:spTree>
+    <p:extLst>
+      <p:ext uri="{BB962C8B-B14F-4D97-AF65-F5344CB8AC3E}">
+        <p14:creationId xmlns:p14="http://schemas.microsoft.com/office/powerpoint/2010/main" val="4197383186"/>
+      </p:ext>
+    </p:extLst>
+  </p:cSld>
+  <p:clrMapOvr>
+    <a:masterClrMapping/>
+  </p:clrMapOvr>
+</p:sld>
+</file>
+
+<file path=ppt/slides/slide7.xml><?xml version="1.0" encoding="utf-8"?>
+<p:sld xmlns:a="http://schemas.openxmlformats.org/drawingml/2006/main" xmlns:r="http://schemas.openxmlformats.org/officeDocument/2006/relationships" xmlns:p="http://schemas.openxmlformats.org/presentationml/2006/main">
+  <p:cSld>
+    <p:spTree>
+      <p:nvGrpSpPr>
+        <p:cNvPr id="1" name=""/>
+        <p:cNvGrpSpPr/>
+        <p:nvPr/>
+      </p:nvGrpSpPr>
+      <p:grpSpPr>
+        <a:xfrm>
+          <a:off x="0" y="0"/>
+          <a:ext cx="0" cy="0"/>
+          <a:chOff x="0" y="0"/>
+          <a:chExt cx="0" cy="0"/>
+        </a:xfrm>
+      </p:grpSpPr>
+      <p:sp>
+        <p:nvSpPr>
+          <p:cNvPr id="4" name="Rectangle 3">
+            <a:extLst>
+              <a:ext uri="{FF2B5EF4-FFF2-40B4-BE49-F238E27FC236}">
+                <a16:creationId xmlns:a16="http://schemas.microsoft.com/office/drawing/2014/main" id="{59F8D8EF-46C1-4B34-B731-18F149D285EF}"/>
+              </a:ext>
+            </a:extLst>
+          </p:cNvPr>
+          <p:cNvSpPr/>
+          <p:nvPr/>
+        </p:nvSpPr>
+        <p:spPr>
+          <a:xfrm>
+            <a:off x="3775395" y="960756"/>
+            <a:ext cx="2541864" cy="1224792"/>
+          </a:xfrm>
+          <a:prstGeom prst="rect">
+            <a:avLst/>
+          </a:prstGeom>
+        </p:spPr>
+        <p:style>
+          <a:lnRef idx="2">
+            <a:schemeClr val="accent1">
+              <a:shade val="50000"/>
+            </a:schemeClr>
+          </a:lnRef>
+          <a:fillRef idx="1">
+            <a:schemeClr val="accent1"/>
+          </a:fillRef>
+          <a:effectRef idx="0">
+            <a:schemeClr val="accent1"/>
+          </a:effectRef>
+          <a:fontRef idx="minor">
+            <a:schemeClr val="lt1"/>
+          </a:fontRef>
+        </p:style>
+        <p:txBody>
+          <a:bodyPr rtlCol="0" anchor="ctr"/>
+          <a:lstStyle/>
+          <a:p>
+            <a:pPr algn="ctr"/>
+            <a:r>
+              <a:rPr lang="en-US" dirty="0"/>
+              <a:t>Animal</a:t>
+            </a:r>
+          </a:p>
+        </p:txBody>
+      </p:sp>
+      <p:sp>
+        <p:nvSpPr>
+          <p:cNvPr id="5" name="Rectangle 4">
+            <a:extLst>
+              <a:ext uri="{FF2B5EF4-FFF2-40B4-BE49-F238E27FC236}">
+                <a16:creationId xmlns:a16="http://schemas.microsoft.com/office/drawing/2014/main" id="{2907F271-5106-440B-9043-6BEEED9B40BE}"/>
+              </a:ext>
+            </a:extLst>
+          </p:cNvPr>
+          <p:cNvSpPr/>
+          <p:nvPr/>
+        </p:nvSpPr>
+        <p:spPr>
+          <a:xfrm>
+            <a:off x="1677798" y="2457974"/>
+            <a:ext cx="2290195" cy="1325461"/>
+          </a:xfrm>
+          <a:prstGeom prst="rect">
+            <a:avLst/>
+          </a:prstGeom>
+        </p:spPr>
+        <p:style>
+          <a:lnRef idx="2">
+            <a:schemeClr val="accent1">
+              <a:shade val="50000"/>
+            </a:schemeClr>
+          </a:lnRef>
+          <a:fillRef idx="1">
+            <a:schemeClr val="accent1"/>
+          </a:fillRef>
+          <a:effectRef idx="0">
+            <a:schemeClr val="accent1"/>
+          </a:effectRef>
+          <a:fontRef idx="minor">
+            <a:schemeClr val="lt1"/>
+          </a:fontRef>
+        </p:style>
+        <p:txBody>
+          <a:bodyPr rtlCol="0" anchor="ctr"/>
+          <a:lstStyle/>
+          <a:p>
+            <a:pPr algn="ctr"/>
+            <a:r>
+              <a:rPr lang="en-US" dirty="0"/>
+              <a:t>Dog</a:t>
+            </a:r>
+          </a:p>
+        </p:txBody>
+      </p:sp>
+      <p:sp>
+        <p:nvSpPr>
+          <p:cNvPr id="7" name="Rectangle 6">
+            <a:extLst>
+              <a:ext uri="{FF2B5EF4-FFF2-40B4-BE49-F238E27FC236}">
+                <a16:creationId xmlns:a16="http://schemas.microsoft.com/office/drawing/2014/main" id="{AB356056-B4D7-4CA5-A0CB-CC16ABE7C84B}"/>
+              </a:ext>
+            </a:extLst>
+          </p:cNvPr>
+          <p:cNvSpPr/>
+          <p:nvPr/>
+        </p:nvSpPr>
+        <p:spPr>
+          <a:xfrm>
+            <a:off x="6096000" y="2457974"/>
+            <a:ext cx="2290195" cy="1325461"/>
+          </a:xfrm>
+          <a:prstGeom prst="rect">
+            <a:avLst/>
+          </a:prstGeom>
+        </p:spPr>
+        <p:style>
+          <a:lnRef idx="2">
+            <a:schemeClr val="accent1">
+              <a:shade val="50000"/>
+            </a:schemeClr>
+          </a:lnRef>
+          <a:fillRef idx="1">
+            <a:schemeClr val="accent1"/>
+          </a:fillRef>
+          <a:effectRef idx="0">
+            <a:schemeClr val="accent1"/>
+          </a:effectRef>
+          <a:fontRef idx="minor">
+            <a:schemeClr val="lt1"/>
+          </a:fontRef>
+        </p:style>
+        <p:txBody>
+          <a:bodyPr rtlCol="0" anchor="ctr"/>
+          <a:lstStyle/>
+          <a:p>
+            <a:pPr algn="ctr"/>
+            <a:r>
+              <a:rPr lang="en-US" dirty="0"/>
+              <a:t>Cat</a:t>
+            </a:r>
+          </a:p>
+        </p:txBody>
+      </p:sp>
+      <p:cxnSp>
+        <p:nvCxnSpPr>
+          <p:cNvPr id="9" name="Straight Arrow Connector 8">
+            <a:extLst>
+              <a:ext uri="{FF2B5EF4-FFF2-40B4-BE49-F238E27FC236}">
+                <a16:creationId xmlns:a16="http://schemas.microsoft.com/office/drawing/2014/main" id="{18BC0756-76C1-4C36-998A-A6191D86BDB1}"/>
+              </a:ext>
+            </a:extLst>
+          </p:cNvPr>
+          <p:cNvCxnSpPr>
+            <a:cxnSpLocks/>
+          </p:cNvCxnSpPr>
+          <p:nvPr/>
+        </p:nvCxnSpPr>
+        <p:spPr>
+          <a:xfrm flipH="1">
+            <a:off x="3322738" y="2051108"/>
+            <a:ext cx="545286" cy="813732"/>
+          </a:xfrm>
+          <a:prstGeom prst="straightConnector1">
+            <a:avLst/>
+          </a:prstGeom>
+          <a:ln>
+            <a:tailEnd type="triangle"/>
+          </a:ln>
+        </p:spPr>
+        <p:style>
+          <a:lnRef idx="1">
+            <a:schemeClr val="dk1"/>
+          </a:lnRef>
+          <a:fillRef idx="0">
+            <a:schemeClr val="dk1"/>
+          </a:fillRef>
+          <a:effectRef idx="0">
+            <a:schemeClr val="dk1"/>
+          </a:effectRef>
+          <a:fontRef idx="minor">
+            <a:schemeClr val="tx1"/>
+          </a:fontRef>
+        </p:style>
+      </p:cxnSp>
+      <p:cxnSp>
+        <p:nvCxnSpPr>
+          <p:cNvPr id="12" name="Straight Arrow Connector 11">
+            <a:extLst>
+              <a:ext uri="{FF2B5EF4-FFF2-40B4-BE49-F238E27FC236}">
+                <a16:creationId xmlns:a16="http://schemas.microsoft.com/office/drawing/2014/main" id="{1F6E9104-EE23-41A6-8560-D41A82FB87CE}"/>
+              </a:ext>
+            </a:extLst>
+          </p:cNvPr>
+          <p:cNvCxnSpPr>
+            <a:cxnSpLocks/>
+          </p:cNvCxnSpPr>
+          <p:nvPr/>
+        </p:nvCxnSpPr>
+        <p:spPr>
+          <a:xfrm>
+            <a:off x="6314114" y="2120317"/>
+            <a:ext cx="707472" cy="838899"/>
+          </a:xfrm>
+          <a:prstGeom prst="straightConnector1">
+            <a:avLst/>
+          </a:prstGeom>
+          <a:ln>
+            <a:tailEnd type="triangle"/>
+          </a:ln>
+        </p:spPr>
+        <p:style>
+          <a:lnRef idx="1">
+            <a:schemeClr val="dk1"/>
+          </a:lnRef>
+          <a:fillRef idx="0">
+            <a:schemeClr val="dk1"/>
+          </a:fillRef>
+          <a:effectRef idx="0">
+            <a:schemeClr val="dk1"/>
+          </a:effectRef>
+          <a:fontRef idx="minor">
+            <a:schemeClr val="tx1"/>
+          </a:fontRef>
+        </p:style>
+      </p:cxnSp>
+      <p:sp>
+        <p:nvSpPr>
+          <p:cNvPr id="15" name="Rectangle 14">
+            <a:extLst>
+              <a:ext uri="{FF2B5EF4-FFF2-40B4-BE49-F238E27FC236}">
+                <a16:creationId xmlns:a16="http://schemas.microsoft.com/office/drawing/2014/main" id="{48CE8D1D-069A-4D8E-B72F-C0FF9640A68D}"/>
+              </a:ext>
+            </a:extLst>
+          </p:cNvPr>
+          <p:cNvSpPr/>
+          <p:nvPr/>
+        </p:nvSpPr>
+        <p:spPr>
+          <a:xfrm>
+            <a:off x="1677797" y="4651695"/>
+            <a:ext cx="2290195" cy="1325461"/>
+          </a:xfrm>
+          <a:prstGeom prst="rect">
+            <a:avLst/>
+          </a:prstGeom>
+        </p:spPr>
+        <p:style>
+          <a:lnRef idx="2">
+            <a:schemeClr val="accent1">
+              <a:shade val="50000"/>
+            </a:schemeClr>
+          </a:lnRef>
+          <a:fillRef idx="1">
+            <a:schemeClr val="accent1"/>
+          </a:fillRef>
+          <a:effectRef idx="0">
+            <a:schemeClr val="accent1"/>
+          </a:effectRef>
+          <a:fontRef idx="minor">
+            <a:schemeClr val="lt1"/>
+          </a:fontRef>
+        </p:style>
+        <p:txBody>
+          <a:bodyPr rtlCol="0" anchor="ctr"/>
+          <a:lstStyle/>
+          <a:p>
+            <a:pPr algn="ctr"/>
+            <a:r>
+              <a:rPr lang="en-US" dirty="0"/>
+              <a:t>Husky</a:t>
+            </a:r>
+          </a:p>
+        </p:txBody>
+      </p:sp>
+      <p:cxnSp>
+        <p:nvCxnSpPr>
+          <p:cNvPr id="17" name="Straight Arrow Connector 16">
+            <a:extLst>
+              <a:ext uri="{FF2B5EF4-FFF2-40B4-BE49-F238E27FC236}">
+                <a16:creationId xmlns:a16="http://schemas.microsoft.com/office/drawing/2014/main" id="{7E6FCB34-FB1D-40B8-B304-8A9E4A891A89}"/>
+              </a:ext>
+            </a:extLst>
+          </p:cNvPr>
+          <p:cNvCxnSpPr/>
+          <p:nvPr/>
+        </p:nvCxnSpPr>
+        <p:spPr>
+          <a:xfrm>
+            <a:off x="2789338" y="3892492"/>
+            <a:ext cx="0" cy="637563"/>
+          </a:xfrm>
+          <a:prstGeom prst="straightConnector1">
+            <a:avLst/>
+          </a:prstGeom>
+          <a:ln>
+            <a:tailEnd type="triangle"/>
+          </a:ln>
+        </p:spPr>
+        <p:style>
+          <a:lnRef idx="1">
+            <a:schemeClr val="accent1"/>
+          </a:lnRef>
+          <a:fillRef idx="0">
+            <a:schemeClr val="accent1"/>
+          </a:fillRef>
+          <a:effectRef idx="0">
+            <a:schemeClr val="accent1"/>
+          </a:effectRef>
+          <a:fontRef idx="minor">
+            <a:schemeClr val="tx1"/>
+          </a:fontRef>
+        </p:style>
+      </p:cxnSp>
+      <p:sp>
+        <p:nvSpPr>
+          <p:cNvPr id="18" name="TextBox 17">
+            <a:extLst>
+              <a:ext uri="{FF2B5EF4-FFF2-40B4-BE49-F238E27FC236}">
+                <a16:creationId xmlns:a16="http://schemas.microsoft.com/office/drawing/2014/main" id="{46EEB396-E765-4269-8C38-94C90C890D6D}"/>
+              </a:ext>
+            </a:extLst>
+          </p:cNvPr>
+          <p:cNvSpPr txBox="1"/>
+          <p:nvPr/>
+        </p:nvSpPr>
+        <p:spPr>
+          <a:xfrm>
+            <a:off x="696286" y="335560"/>
+            <a:ext cx="2810311" cy="369332"/>
+          </a:xfrm>
+          <a:prstGeom prst="rect">
+            <a:avLst/>
+          </a:prstGeom>
+          <a:noFill/>
+        </p:spPr>
+        <p:txBody>
+          <a:bodyPr wrap="square" rtlCol="0">
+            <a:spAutoFit/>
+          </a:bodyPr>
+          <a:lstStyle/>
+          <a:p>
+            <a:r>
+              <a:rPr lang="en-US" dirty="0"/>
+              <a:t>Inheritance Hierarchy</a:t>
+            </a:r>
+          </a:p>
+        </p:txBody>
+      </p:sp>
+      <p:sp>
+        <p:nvSpPr>
+          <p:cNvPr id="19" name="Rectangle 18">
+            <a:extLst>
+              <a:ext uri="{FF2B5EF4-FFF2-40B4-BE49-F238E27FC236}">
+                <a16:creationId xmlns:a16="http://schemas.microsoft.com/office/drawing/2014/main" id="{561005AD-3EA2-4042-BE6B-0A825DFF2A05}"/>
+              </a:ext>
+            </a:extLst>
+          </p:cNvPr>
+          <p:cNvSpPr/>
+          <p:nvPr/>
+        </p:nvSpPr>
+        <p:spPr>
+          <a:xfrm>
+            <a:off x="3868024" y="67112"/>
+            <a:ext cx="2356607" cy="637780"/>
+          </a:xfrm>
+          <a:prstGeom prst="rect">
+            <a:avLst/>
+          </a:prstGeom>
+        </p:spPr>
+        <p:style>
+          <a:lnRef idx="2">
+            <a:schemeClr val="accent1">
+              <a:shade val="50000"/>
+            </a:schemeClr>
+          </a:lnRef>
+          <a:fillRef idx="1">
+            <a:schemeClr val="accent1"/>
+          </a:fillRef>
+          <a:effectRef idx="0">
+            <a:schemeClr val="accent1"/>
+          </a:effectRef>
+          <a:fontRef idx="minor">
+            <a:schemeClr val="lt1"/>
+          </a:fontRef>
+        </p:style>
+        <p:txBody>
+          <a:bodyPr rtlCol="0" anchor="ctr"/>
+          <a:lstStyle/>
+          <a:p>
+            <a:pPr algn="ctr"/>
+            <a:r>
+              <a:rPr lang="en-US" dirty="0"/>
+              <a:t>Object</a:t>
+            </a:r>
+          </a:p>
+        </p:txBody>
+      </p:sp>
+      <p:cxnSp>
+        <p:nvCxnSpPr>
+          <p:cNvPr id="21" name="Straight Arrow Connector 20">
+            <a:extLst>
+              <a:ext uri="{FF2B5EF4-FFF2-40B4-BE49-F238E27FC236}">
+                <a16:creationId xmlns:a16="http://schemas.microsoft.com/office/drawing/2014/main" id="{DCD97F29-872E-49CE-BD14-56056A8D5BDB}"/>
+              </a:ext>
+            </a:extLst>
+          </p:cNvPr>
+          <p:cNvCxnSpPr>
+            <a:stCxn id="19" idx="2"/>
+            <a:endCxn id="4" idx="0"/>
+          </p:cNvCxnSpPr>
+          <p:nvPr/>
+        </p:nvCxnSpPr>
+        <p:spPr>
+          <a:xfrm flipH="1">
+            <a:off x="5046327" y="704892"/>
+            <a:ext cx="1" cy="255864"/>
+          </a:xfrm>
+          <a:prstGeom prst="straightConnector1">
+            <a:avLst/>
+          </a:prstGeom>
+          <a:ln>
+            <a:tailEnd type="triangle"/>
+          </a:ln>
+        </p:spPr>
+        <p:style>
+          <a:lnRef idx="1">
+            <a:schemeClr val="dk1"/>
+          </a:lnRef>
+          <a:fillRef idx="0">
+            <a:schemeClr val="dk1"/>
+          </a:fillRef>
+          <a:effectRef idx="0">
+            <a:schemeClr val="dk1"/>
+          </a:effectRef>
+          <a:fontRef idx="minor">
+            <a:schemeClr val="tx1"/>
+          </a:fontRef>
+        </p:style>
+      </p:cxnSp>
+      <p:sp>
+        <p:nvSpPr>
+          <p:cNvPr id="22" name="TextBox 21">
+            <a:extLst>
+              <a:ext uri="{FF2B5EF4-FFF2-40B4-BE49-F238E27FC236}">
+                <a16:creationId xmlns:a16="http://schemas.microsoft.com/office/drawing/2014/main" id="{A018E9AD-63E2-47FB-A95B-8677E530FAF2}"/>
+              </a:ext>
+            </a:extLst>
+          </p:cNvPr>
+          <p:cNvSpPr txBox="1"/>
+          <p:nvPr/>
+        </p:nvSpPr>
+        <p:spPr>
+          <a:xfrm>
+            <a:off x="696286" y="921125"/>
+            <a:ext cx="2541864" cy="646331"/>
+          </a:xfrm>
+          <a:prstGeom prst="rect">
+            <a:avLst/>
+          </a:prstGeom>
+          <a:noFill/>
+        </p:spPr>
+        <p:txBody>
+          <a:bodyPr wrap="square" rtlCol="0">
+            <a:spAutoFit/>
+          </a:bodyPr>
+          <a:lstStyle/>
+          <a:p>
+            <a:r>
+              <a:rPr lang="en-US" dirty="0"/>
+              <a:t>Classes can only directly inherit 1 other class</a:t>
+            </a:r>
+          </a:p>
+        </p:txBody>
+      </p:sp>
+    </p:spTree>
+    <p:extLst>
+      <p:ext uri="{BB962C8B-B14F-4D97-AF65-F5344CB8AC3E}">
+        <p14:creationId xmlns:p14="http://schemas.microsoft.com/office/powerpoint/2010/main" val="1193803233"/>
+      </p:ext>
+    </p:extLst>
+  </p:cSld>
+  <p:clrMapOvr>
+    <a:masterClrMapping/>
+  </p:clrMapOvr>
+</p:sld>
+</file>
+
+<file path=ppt/slides/slide8.xml><?xml version="1.0" encoding="utf-8"?>
+<p:sld xmlns:a="http://schemas.openxmlformats.org/drawingml/2006/main" xmlns:r="http://schemas.openxmlformats.org/officeDocument/2006/relationships" xmlns:p="http://schemas.openxmlformats.org/presentationml/2006/main">
+  <p:cSld>
+    <p:spTree>
+      <p:nvGrpSpPr>
+        <p:cNvPr id="1" name=""/>
+        <p:cNvGrpSpPr/>
+        <p:nvPr/>
+      </p:nvGrpSpPr>
+      <p:grpSpPr>
+        <a:xfrm>
+          <a:off x="0" y="0"/>
+          <a:ext cx="0" cy="0"/>
+          <a:chOff x="0" y="0"/>
+          <a:chExt cx="0" cy="0"/>
+        </a:xfrm>
+      </p:grpSpPr>
+      <p:sp>
+        <p:nvSpPr>
+          <p:cNvPr id="4" name="Rectangle 3">
+            <a:extLst>
+              <a:ext uri="{FF2B5EF4-FFF2-40B4-BE49-F238E27FC236}">
+                <a16:creationId xmlns:a16="http://schemas.microsoft.com/office/drawing/2014/main" id="{9E8311C9-79F2-4CCF-A08D-C94E2786EB64}"/>
+              </a:ext>
+            </a:extLst>
+          </p:cNvPr>
+          <p:cNvSpPr/>
+          <p:nvPr/>
+        </p:nvSpPr>
+        <p:spPr>
+          <a:xfrm>
+            <a:off x="1115736" y="520117"/>
+            <a:ext cx="3540154" cy="1249960"/>
+          </a:xfrm>
+          <a:prstGeom prst="rect">
+            <a:avLst/>
+          </a:prstGeom>
+        </p:spPr>
+        <p:style>
+          <a:lnRef idx="2">
+            <a:schemeClr val="accent1">
+              <a:shade val="50000"/>
+            </a:schemeClr>
+          </a:lnRef>
+          <a:fillRef idx="1">
+            <a:schemeClr val="accent1"/>
+          </a:fillRef>
+          <a:effectRef idx="0">
+            <a:schemeClr val="accent1"/>
+          </a:effectRef>
+          <a:fontRef idx="minor">
+            <a:schemeClr val="lt1"/>
+          </a:fontRef>
+        </p:style>
+        <p:txBody>
+          <a:bodyPr rtlCol="0" anchor="ctr"/>
+          <a:lstStyle/>
+          <a:p>
+            <a:pPr algn="ctr"/>
+            <a:r>
+              <a:rPr lang="en-US" dirty="0"/>
+              <a:t>An array of size 3</a:t>
+            </a:r>
+          </a:p>
+        </p:txBody>
+      </p:sp>
+      <p:sp>
+        <p:nvSpPr>
+          <p:cNvPr id="5" name="TextBox 4">
+            <a:extLst>
+              <a:ext uri="{FF2B5EF4-FFF2-40B4-BE49-F238E27FC236}">
+                <a16:creationId xmlns:a16="http://schemas.microsoft.com/office/drawing/2014/main" id="{23847963-C364-499A-8AEA-E134F764F2D7}"/>
+              </a:ext>
+            </a:extLst>
+          </p:cNvPr>
+          <p:cNvSpPr txBox="1"/>
+          <p:nvPr/>
+        </p:nvSpPr>
+        <p:spPr>
+          <a:xfrm>
+            <a:off x="1619075" y="5243119"/>
+            <a:ext cx="1166070" cy="369332"/>
+          </a:xfrm>
+          <a:prstGeom prst="rect">
+            <a:avLst/>
+          </a:prstGeom>
+          <a:noFill/>
+        </p:spPr>
+        <p:txBody>
+          <a:bodyPr wrap="square" rtlCol="0">
+            <a:spAutoFit/>
+          </a:bodyPr>
+          <a:lstStyle/>
+          <a:p>
+            <a:r>
+              <a:rPr lang="en-US" dirty="0"/>
+              <a:t>int[] </a:t>
+            </a:r>
+            <a:r>
+              <a:rPr lang="en-US" dirty="0" err="1"/>
+              <a:t>arr</a:t>
+            </a:r>
+            <a:endParaRPr lang="en-US" dirty="0"/>
+          </a:p>
+        </p:txBody>
+      </p:sp>
+      <p:cxnSp>
+        <p:nvCxnSpPr>
+          <p:cNvPr id="7" name="Straight Arrow Connector 6">
+            <a:extLst>
+              <a:ext uri="{FF2B5EF4-FFF2-40B4-BE49-F238E27FC236}">
+                <a16:creationId xmlns:a16="http://schemas.microsoft.com/office/drawing/2014/main" id="{C5171CC1-C4BE-44FC-8A75-7769D8B0331C}"/>
+              </a:ext>
+            </a:extLst>
+          </p:cNvPr>
+          <p:cNvCxnSpPr>
+            <a:cxnSpLocks/>
+          </p:cNvCxnSpPr>
+          <p:nvPr/>
+        </p:nvCxnSpPr>
+        <p:spPr>
+          <a:xfrm flipV="1">
+            <a:off x="2072081" y="1922477"/>
+            <a:ext cx="713064" cy="3219975"/>
+          </a:xfrm>
+          <a:prstGeom prst="straightConnector1">
+            <a:avLst/>
+          </a:prstGeom>
+          <a:ln>
+            <a:tailEnd type="triangle"/>
+          </a:ln>
+        </p:spPr>
+        <p:style>
+          <a:lnRef idx="1">
+            <a:schemeClr val="accent1"/>
+          </a:lnRef>
+          <a:fillRef idx="0">
+            <a:schemeClr val="accent1"/>
+          </a:fillRef>
+          <a:effectRef idx="0">
+            <a:schemeClr val="accent1"/>
+          </a:effectRef>
+          <a:fontRef idx="minor">
+            <a:schemeClr val="tx1"/>
+          </a:fontRef>
+        </p:style>
+      </p:cxnSp>
+      <p:sp>
+        <p:nvSpPr>
+          <p:cNvPr id="9" name="Rectangle 8">
+            <a:extLst>
+              <a:ext uri="{FF2B5EF4-FFF2-40B4-BE49-F238E27FC236}">
+                <a16:creationId xmlns:a16="http://schemas.microsoft.com/office/drawing/2014/main" id="{951C1514-B72A-4AF2-B0A9-C02D5DF984C3}"/>
+              </a:ext>
+            </a:extLst>
+          </p:cNvPr>
+          <p:cNvSpPr/>
+          <p:nvPr/>
+        </p:nvSpPr>
+        <p:spPr>
+          <a:xfrm>
+            <a:off x="6720980" y="672517"/>
+            <a:ext cx="3540154" cy="1249960"/>
+          </a:xfrm>
+          <a:prstGeom prst="rect">
+            <a:avLst/>
+          </a:prstGeom>
+        </p:spPr>
+        <p:style>
+          <a:lnRef idx="2">
+            <a:schemeClr val="accent1">
+              <a:shade val="50000"/>
+            </a:schemeClr>
+          </a:lnRef>
+          <a:fillRef idx="1">
+            <a:schemeClr val="accent1"/>
+          </a:fillRef>
+          <a:effectRef idx="0">
+            <a:schemeClr val="accent1"/>
+          </a:effectRef>
+          <a:fontRef idx="minor">
+            <a:schemeClr val="lt1"/>
+          </a:fontRef>
+        </p:style>
+        <p:txBody>
+          <a:bodyPr rtlCol="0" anchor="ctr"/>
+          <a:lstStyle/>
+          <a:p>
+            <a:pPr algn="ctr"/>
+            <a:r>
+              <a:rPr lang="en-US" dirty="0"/>
+              <a:t>An array of size 6</a:t>
+            </a:r>
+          </a:p>
+        </p:txBody>
+      </p:sp>
+    </p:spTree>
+    <p:extLst>
+      <p:ext uri="{BB962C8B-B14F-4D97-AF65-F5344CB8AC3E}">
+        <p14:creationId xmlns:p14="http://schemas.microsoft.com/office/powerpoint/2010/main" val="3640984087"/>
+      </p:ext>
+    </p:extLst>
+  </p:cSld>
+  <p:clrMapOvr>
+    <a:masterClrMapping/>
+  </p:clrMapOvr>
+</p:sld>
+</file>
+
 <file path=ppt/theme/theme1.xml><?xml version="1.0" encoding="utf-8"?>
 <a:theme xmlns:a="http://schemas.openxmlformats.org/drawingml/2006/main" name="Office Theme">
   <a:themeElements>

</xml_diff>

<commit_message>
Add demos and notes on strings, stringbuilder, abstraction, generics, and collections
</commit_message>
<xml_diff>
--- a/notes/diagrams.pptx
+++ b/notes/diagrams.pptx
@@ -13,6 +13,7 @@
     <p:sldId id="261" r:id="rId7"/>
     <p:sldId id="262" r:id="rId8"/>
     <p:sldId id="263" r:id="rId9"/>
+    <p:sldId id="264" r:id="rId10"/>
   </p:sldIdLst>
   <p:sldSz cx="12192000" cy="6858000"/>
   <p:notesSz cx="6858000" cy="9144000"/>
@@ -266,7 +267,7 @@
           <a:p>
             <a:fld id="{F727E16F-4A15-461D-9B68-73BD12FBB2C2}" type="datetimeFigureOut">
               <a:rPr lang="en-US" smtClean="0"/>
-              <a:t>2/10/2021</a:t>
+              <a:t>2/11/2021</a:t>
             </a:fld>
             <a:endParaRPr lang="en-US"/>
           </a:p>
@@ -464,7 +465,7 @@
           <a:p>
             <a:fld id="{F727E16F-4A15-461D-9B68-73BD12FBB2C2}" type="datetimeFigureOut">
               <a:rPr lang="en-US" smtClean="0"/>
-              <a:t>2/10/2021</a:t>
+              <a:t>2/11/2021</a:t>
             </a:fld>
             <a:endParaRPr lang="en-US"/>
           </a:p>
@@ -672,7 +673,7 @@
           <a:p>
             <a:fld id="{F727E16F-4A15-461D-9B68-73BD12FBB2C2}" type="datetimeFigureOut">
               <a:rPr lang="en-US" smtClean="0"/>
-              <a:t>2/10/2021</a:t>
+              <a:t>2/11/2021</a:t>
             </a:fld>
             <a:endParaRPr lang="en-US"/>
           </a:p>
@@ -870,7 +871,7 @@
           <a:p>
             <a:fld id="{F727E16F-4A15-461D-9B68-73BD12FBB2C2}" type="datetimeFigureOut">
               <a:rPr lang="en-US" smtClean="0"/>
-              <a:t>2/10/2021</a:t>
+              <a:t>2/11/2021</a:t>
             </a:fld>
             <a:endParaRPr lang="en-US"/>
           </a:p>
@@ -1145,7 +1146,7 @@
           <a:p>
             <a:fld id="{F727E16F-4A15-461D-9B68-73BD12FBB2C2}" type="datetimeFigureOut">
               <a:rPr lang="en-US" smtClean="0"/>
-              <a:t>2/10/2021</a:t>
+              <a:t>2/11/2021</a:t>
             </a:fld>
             <a:endParaRPr lang="en-US"/>
           </a:p>
@@ -1410,7 +1411,7 @@
           <a:p>
             <a:fld id="{F727E16F-4A15-461D-9B68-73BD12FBB2C2}" type="datetimeFigureOut">
               <a:rPr lang="en-US" smtClean="0"/>
-              <a:t>2/10/2021</a:t>
+              <a:t>2/11/2021</a:t>
             </a:fld>
             <a:endParaRPr lang="en-US"/>
           </a:p>
@@ -1822,7 +1823,7 @@
           <a:p>
             <a:fld id="{F727E16F-4A15-461D-9B68-73BD12FBB2C2}" type="datetimeFigureOut">
               <a:rPr lang="en-US" smtClean="0"/>
-              <a:t>2/10/2021</a:t>
+              <a:t>2/11/2021</a:t>
             </a:fld>
             <a:endParaRPr lang="en-US"/>
           </a:p>
@@ -1963,7 +1964,7 @@
           <a:p>
             <a:fld id="{F727E16F-4A15-461D-9B68-73BD12FBB2C2}" type="datetimeFigureOut">
               <a:rPr lang="en-US" smtClean="0"/>
-              <a:t>2/10/2021</a:t>
+              <a:t>2/11/2021</a:t>
             </a:fld>
             <a:endParaRPr lang="en-US"/>
           </a:p>
@@ -2076,7 +2077,7 @@
           <a:p>
             <a:fld id="{F727E16F-4A15-461D-9B68-73BD12FBB2C2}" type="datetimeFigureOut">
               <a:rPr lang="en-US" smtClean="0"/>
-              <a:t>2/10/2021</a:t>
+              <a:t>2/11/2021</a:t>
             </a:fld>
             <a:endParaRPr lang="en-US"/>
           </a:p>
@@ -2387,7 +2388,7 @@
           <a:p>
             <a:fld id="{F727E16F-4A15-461D-9B68-73BD12FBB2C2}" type="datetimeFigureOut">
               <a:rPr lang="en-US" smtClean="0"/>
-              <a:t>2/10/2021</a:t>
+              <a:t>2/11/2021</a:t>
             </a:fld>
             <a:endParaRPr lang="en-US"/>
           </a:p>
@@ -2675,7 +2676,7 @@
           <a:p>
             <a:fld id="{F727E16F-4A15-461D-9B68-73BD12FBB2C2}" type="datetimeFigureOut">
               <a:rPr lang="en-US" smtClean="0"/>
-              <a:t>2/10/2021</a:t>
+              <a:t>2/11/2021</a:t>
             </a:fld>
             <a:endParaRPr lang="en-US"/>
           </a:p>
@@ -2916,7 +2917,7 @@
           <a:p>
             <a:fld id="{F727E16F-4A15-461D-9B68-73BD12FBB2C2}" type="datetimeFigureOut">
               <a:rPr lang="en-US" smtClean="0"/>
-              <a:t>2/10/2021</a:t>
+              <a:t>2/11/2021</a:t>
             </a:fld>
             <a:endParaRPr lang="en-US"/>
           </a:p>
@@ -7290,6 +7291,632 @@
 </p:sld>
 </file>
 
+<file path=ppt/slides/slide9.xml><?xml version="1.0" encoding="utf-8"?>
+<p:sld xmlns:a="http://schemas.openxmlformats.org/drawingml/2006/main" xmlns:r="http://schemas.openxmlformats.org/officeDocument/2006/relationships" xmlns:p="http://schemas.openxmlformats.org/presentationml/2006/main">
+  <p:cSld>
+    <p:spTree>
+      <p:nvGrpSpPr>
+        <p:cNvPr id="1" name=""/>
+        <p:cNvGrpSpPr/>
+        <p:nvPr/>
+      </p:nvGrpSpPr>
+      <p:grpSpPr>
+        <a:xfrm>
+          <a:off x="0" y="0"/>
+          <a:ext cx="0" cy="0"/>
+          <a:chOff x="0" y="0"/>
+          <a:chExt cx="0" cy="0"/>
+        </a:xfrm>
+      </p:grpSpPr>
+      <p:sp>
+        <p:nvSpPr>
+          <p:cNvPr id="4" name="Rectangle 3">
+            <a:extLst>
+              <a:ext uri="{FF2B5EF4-FFF2-40B4-BE49-F238E27FC236}">
+                <a16:creationId xmlns:a16="http://schemas.microsoft.com/office/drawing/2014/main" id="{FEFAAB3C-6072-4907-91BC-3F9123E6C05A}"/>
+              </a:ext>
+            </a:extLst>
+          </p:cNvPr>
+          <p:cNvSpPr/>
+          <p:nvPr/>
+        </p:nvSpPr>
+        <p:spPr>
+          <a:xfrm>
+            <a:off x="2332140" y="117447"/>
+            <a:ext cx="2340529" cy="1208014"/>
+          </a:xfrm>
+          <a:prstGeom prst="rect">
+            <a:avLst/>
+          </a:prstGeom>
+        </p:spPr>
+        <p:style>
+          <a:lnRef idx="2">
+            <a:schemeClr val="accent1">
+              <a:shade val="50000"/>
+            </a:schemeClr>
+          </a:lnRef>
+          <a:fillRef idx="1">
+            <a:schemeClr val="accent1"/>
+          </a:fillRef>
+          <a:effectRef idx="0">
+            <a:schemeClr val="accent1"/>
+          </a:effectRef>
+          <a:fontRef idx="minor">
+            <a:schemeClr val="lt1"/>
+          </a:fontRef>
+        </p:style>
+        <p:txBody>
+          <a:bodyPr rtlCol="0" anchor="ctr"/>
+          <a:lstStyle/>
+          <a:p>
+            <a:pPr algn="ctr"/>
+            <a:r>
+              <a:rPr lang="en-US" dirty="0"/>
+              <a:t>Object class</a:t>
+            </a:r>
+          </a:p>
+        </p:txBody>
+      </p:sp>
+      <p:sp>
+        <p:nvSpPr>
+          <p:cNvPr id="5" name="Rectangle 4">
+            <a:extLst>
+              <a:ext uri="{FF2B5EF4-FFF2-40B4-BE49-F238E27FC236}">
+                <a16:creationId xmlns:a16="http://schemas.microsoft.com/office/drawing/2014/main" id="{563180D9-4368-4FD8-89E7-512DB1ABEB7D}"/>
+              </a:ext>
+            </a:extLst>
+          </p:cNvPr>
+          <p:cNvSpPr/>
+          <p:nvPr/>
+        </p:nvSpPr>
+        <p:spPr>
+          <a:xfrm>
+            <a:off x="2332140" y="1929468"/>
+            <a:ext cx="2340529" cy="1208014"/>
+          </a:xfrm>
+          <a:prstGeom prst="rect">
+            <a:avLst/>
+          </a:prstGeom>
+        </p:spPr>
+        <p:style>
+          <a:lnRef idx="2">
+            <a:schemeClr val="accent1">
+              <a:shade val="50000"/>
+            </a:schemeClr>
+          </a:lnRef>
+          <a:fillRef idx="1">
+            <a:schemeClr val="accent1"/>
+          </a:fillRef>
+          <a:effectRef idx="0">
+            <a:schemeClr val="accent1"/>
+          </a:effectRef>
+          <a:fontRef idx="minor">
+            <a:schemeClr val="lt1"/>
+          </a:fontRef>
+        </p:style>
+        <p:txBody>
+          <a:bodyPr rtlCol="0" anchor="ctr"/>
+          <a:lstStyle/>
+          <a:p>
+            <a:pPr algn="ctr"/>
+            <a:r>
+              <a:rPr lang="en-US" dirty="0"/>
+              <a:t>Shape class (abstract)</a:t>
+            </a:r>
+          </a:p>
+        </p:txBody>
+      </p:sp>
+      <p:sp>
+        <p:nvSpPr>
+          <p:cNvPr id="6" name="Rectangle 5">
+            <a:extLst>
+              <a:ext uri="{FF2B5EF4-FFF2-40B4-BE49-F238E27FC236}">
+                <a16:creationId xmlns:a16="http://schemas.microsoft.com/office/drawing/2014/main" id="{BD7E5DF0-63A8-4944-AF97-015232F3D6CE}"/>
+              </a:ext>
+            </a:extLst>
+          </p:cNvPr>
+          <p:cNvSpPr/>
+          <p:nvPr/>
+        </p:nvSpPr>
+        <p:spPr>
+          <a:xfrm>
+            <a:off x="5385732" y="872455"/>
+            <a:ext cx="1946246" cy="1057013"/>
+          </a:xfrm>
+          <a:prstGeom prst="rect">
+            <a:avLst/>
+          </a:prstGeom>
+        </p:spPr>
+        <p:style>
+          <a:lnRef idx="2">
+            <a:schemeClr val="accent2">
+              <a:shade val="50000"/>
+            </a:schemeClr>
+          </a:lnRef>
+          <a:fillRef idx="1">
+            <a:schemeClr val="accent2"/>
+          </a:fillRef>
+          <a:effectRef idx="0">
+            <a:schemeClr val="accent2"/>
+          </a:effectRef>
+          <a:fontRef idx="minor">
+            <a:schemeClr val="lt1"/>
+          </a:fontRef>
+        </p:style>
+        <p:txBody>
+          <a:bodyPr rtlCol="0" anchor="ctr"/>
+          <a:lstStyle/>
+          <a:p>
+            <a:pPr algn="ctr"/>
+            <a:r>
+              <a:rPr lang="en-US" dirty="0"/>
+              <a:t>Calculable interface</a:t>
+            </a:r>
+          </a:p>
+        </p:txBody>
+      </p:sp>
+      <p:cxnSp>
+        <p:nvCxnSpPr>
+          <p:cNvPr id="8" name="Straight Arrow Connector 7">
+            <a:extLst>
+              <a:ext uri="{FF2B5EF4-FFF2-40B4-BE49-F238E27FC236}">
+                <a16:creationId xmlns:a16="http://schemas.microsoft.com/office/drawing/2014/main" id="{26D67D0B-497B-4289-ADC6-2CF2E9121E20}"/>
+              </a:ext>
+            </a:extLst>
+          </p:cNvPr>
+          <p:cNvCxnSpPr/>
+          <p:nvPr/>
+        </p:nvCxnSpPr>
+        <p:spPr>
+          <a:xfrm flipH="1">
+            <a:off x="4672669" y="1719743"/>
+            <a:ext cx="713063" cy="503340"/>
+          </a:xfrm>
+          <a:prstGeom prst="straightConnector1">
+            <a:avLst/>
+          </a:prstGeom>
+          <a:ln>
+            <a:tailEnd type="triangle"/>
+          </a:ln>
+        </p:spPr>
+        <p:style>
+          <a:lnRef idx="1">
+            <a:schemeClr val="dk1"/>
+          </a:lnRef>
+          <a:fillRef idx="0">
+            <a:schemeClr val="dk1"/>
+          </a:fillRef>
+          <a:effectRef idx="0">
+            <a:schemeClr val="dk1"/>
+          </a:effectRef>
+          <a:fontRef idx="minor">
+            <a:schemeClr val="tx1"/>
+          </a:fontRef>
+        </p:style>
+      </p:cxnSp>
+      <p:cxnSp>
+        <p:nvCxnSpPr>
+          <p:cNvPr id="10" name="Straight Arrow Connector 9">
+            <a:extLst>
+              <a:ext uri="{FF2B5EF4-FFF2-40B4-BE49-F238E27FC236}">
+                <a16:creationId xmlns:a16="http://schemas.microsoft.com/office/drawing/2014/main" id="{317AF00D-8A29-4323-B850-E77B6ECF7235}"/>
+              </a:ext>
+            </a:extLst>
+          </p:cNvPr>
+          <p:cNvCxnSpPr/>
+          <p:nvPr/>
+        </p:nvCxnSpPr>
+        <p:spPr>
+          <a:xfrm>
+            <a:off x="3506598" y="1400961"/>
+            <a:ext cx="0" cy="436228"/>
+          </a:xfrm>
+          <a:prstGeom prst="straightConnector1">
+            <a:avLst/>
+          </a:prstGeom>
+          <a:ln>
+            <a:tailEnd type="triangle"/>
+          </a:ln>
+        </p:spPr>
+        <p:style>
+          <a:lnRef idx="1">
+            <a:schemeClr val="dk1"/>
+          </a:lnRef>
+          <a:fillRef idx="0">
+            <a:schemeClr val="dk1"/>
+          </a:fillRef>
+          <a:effectRef idx="0">
+            <a:schemeClr val="dk1"/>
+          </a:effectRef>
+          <a:fontRef idx="minor">
+            <a:schemeClr val="tx1"/>
+          </a:fontRef>
+        </p:style>
+      </p:cxnSp>
+      <p:sp>
+        <p:nvSpPr>
+          <p:cNvPr id="11" name="TextBox 10">
+            <a:extLst>
+              <a:ext uri="{FF2B5EF4-FFF2-40B4-BE49-F238E27FC236}">
+                <a16:creationId xmlns:a16="http://schemas.microsoft.com/office/drawing/2014/main" id="{9963F3CC-9E56-4D95-83FE-89AF5412A748}"/>
+              </a:ext>
+            </a:extLst>
+          </p:cNvPr>
+          <p:cNvSpPr txBox="1"/>
+          <p:nvPr/>
+        </p:nvSpPr>
+        <p:spPr>
+          <a:xfrm>
+            <a:off x="4551029" y="1706944"/>
+            <a:ext cx="1409350" cy="369332"/>
+          </a:xfrm>
+          <a:prstGeom prst="rect">
+            <a:avLst/>
+          </a:prstGeom>
+          <a:noFill/>
+        </p:spPr>
+        <p:txBody>
+          <a:bodyPr wrap="square" rtlCol="0">
+            <a:spAutoFit/>
+          </a:bodyPr>
+          <a:lstStyle/>
+          <a:p>
+            <a:r>
+              <a:rPr lang="en-US" dirty="0"/>
+              <a:t>implements</a:t>
+            </a:r>
+          </a:p>
+        </p:txBody>
+      </p:sp>
+      <p:sp>
+        <p:nvSpPr>
+          <p:cNvPr id="12" name="TextBox 11">
+            <a:extLst>
+              <a:ext uri="{FF2B5EF4-FFF2-40B4-BE49-F238E27FC236}">
+                <a16:creationId xmlns:a16="http://schemas.microsoft.com/office/drawing/2014/main" id="{56F26B6F-8322-4EBC-97ED-6B1071182A18}"/>
+              </a:ext>
+            </a:extLst>
+          </p:cNvPr>
+          <p:cNvSpPr txBox="1"/>
+          <p:nvPr/>
+        </p:nvSpPr>
+        <p:spPr>
+          <a:xfrm>
+            <a:off x="3028428" y="1400961"/>
+            <a:ext cx="1409350" cy="369332"/>
+          </a:xfrm>
+          <a:prstGeom prst="rect">
+            <a:avLst/>
+          </a:prstGeom>
+          <a:noFill/>
+        </p:spPr>
+        <p:txBody>
+          <a:bodyPr wrap="square" rtlCol="0">
+            <a:spAutoFit/>
+          </a:bodyPr>
+          <a:lstStyle/>
+          <a:p>
+            <a:r>
+              <a:rPr lang="en-US" dirty="0"/>
+              <a:t>extends</a:t>
+            </a:r>
+          </a:p>
+        </p:txBody>
+      </p:sp>
+      <p:sp>
+        <p:nvSpPr>
+          <p:cNvPr id="13" name="Rectangle 12">
+            <a:extLst>
+              <a:ext uri="{FF2B5EF4-FFF2-40B4-BE49-F238E27FC236}">
+                <a16:creationId xmlns:a16="http://schemas.microsoft.com/office/drawing/2014/main" id="{3A563703-CDEF-42C4-9FDF-355FA9773184}"/>
+              </a:ext>
+            </a:extLst>
+          </p:cNvPr>
+          <p:cNvSpPr/>
+          <p:nvPr/>
+        </p:nvSpPr>
+        <p:spPr>
+          <a:xfrm>
+            <a:off x="1057013" y="4118994"/>
+            <a:ext cx="2063692" cy="1208014"/>
+          </a:xfrm>
+          <a:prstGeom prst="rect">
+            <a:avLst/>
+          </a:prstGeom>
+        </p:spPr>
+        <p:style>
+          <a:lnRef idx="2">
+            <a:schemeClr val="accent1">
+              <a:shade val="50000"/>
+            </a:schemeClr>
+          </a:lnRef>
+          <a:fillRef idx="1">
+            <a:schemeClr val="accent1"/>
+          </a:fillRef>
+          <a:effectRef idx="0">
+            <a:schemeClr val="accent1"/>
+          </a:effectRef>
+          <a:fontRef idx="minor">
+            <a:schemeClr val="lt1"/>
+          </a:fontRef>
+        </p:style>
+        <p:txBody>
+          <a:bodyPr rtlCol="0" anchor="ctr"/>
+          <a:lstStyle/>
+          <a:p>
+            <a:pPr algn="ctr"/>
+            <a:r>
+              <a:rPr lang="en-US" dirty="0"/>
+              <a:t>Circle class</a:t>
+            </a:r>
+          </a:p>
+        </p:txBody>
+      </p:sp>
+      <p:sp>
+        <p:nvSpPr>
+          <p:cNvPr id="14" name="Rectangle 13">
+            <a:extLst>
+              <a:ext uri="{FF2B5EF4-FFF2-40B4-BE49-F238E27FC236}">
+                <a16:creationId xmlns:a16="http://schemas.microsoft.com/office/drawing/2014/main" id="{D1D21827-0DF0-495E-B921-E6DF8303405C}"/>
+              </a:ext>
+            </a:extLst>
+          </p:cNvPr>
+          <p:cNvSpPr/>
+          <p:nvPr/>
+        </p:nvSpPr>
+        <p:spPr>
+          <a:xfrm>
+            <a:off x="3733103" y="4118994"/>
+            <a:ext cx="2063692" cy="1208014"/>
+          </a:xfrm>
+          <a:prstGeom prst="rect">
+            <a:avLst/>
+          </a:prstGeom>
+        </p:spPr>
+        <p:style>
+          <a:lnRef idx="2">
+            <a:schemeClr val="accent1">
+              <a:shade val="50000"/>
+            </a:schemeClr>
+          </a:lnRef>
+          <a:fillRef idx="1">
+            <a:schemeClr val="accent1"/>
+          </a:fillRef>
+          <a:effectRef idx="0">
+            <a:schemeClr val="accent1"/>
+          </a:effectRef>
+          <a:fontRef idx="minor">
+            <a:schemeClr val="lt1"/>
+          </a:fontRef>
+        </p:style>
+        <p:txBody>
+          <a:bodyPr rtlCol="0" anchor="ctr"/>
+          <a:lstStyle/>
+          <a:p>
+            <a:pPr algn="ctr"/>
+            <a:r>
+              <a:rPr lang="en-US" dirty="0"/>
+              <a:t>Triangle class</a:t>
+            </a:r>
+          </a:p>
+        </p:txBody>
+      </p:sp>
+      <p:cxnSp>
+        <p:nvCxnSpPr>
+          <p:cNvPr id="16" name="Straight Arrow Connector 15">
+            <a:extLst>
+              <a:ext uri="{FF2B5EF4-FFF2-40B4-BE49-F238E27FC236}">
+                <a16:creationId xmlns:a16="http://schemas.microsoft.com/office/drawing/2014/main" id="{B0678884-C68C-4059-AFA3-A2E7E72D4E07}"/>
+              </a:ext>
+            </a:extLst>
+          </p:cNvPr>
+          <p:cNvCxnSpPr/>
+          <p:nvPr/>
+        </p:nvCxnSpPr>
+        <p:spPr>
+          <a:xfrm flipH="1">
+            <a:off x="2483141" y="3204594"/>
+            <a:ext cx="285226" cy="746621"/>
+          </a:xfrm>
+          <a:prstGeom prst="straightConnector1">
+            <a:avLst/>
+          </a:prstGeom>
+          <a:ln>
+            <a:tailEnd type="triangle"/>
+          </a:ln>
+        </p:spPr>
+        <p:style>
+          <a:lnRef idx="1">
+            <a:schemeClr val="dk1"/>
+          </a:lnRef>
+          <a:fillRef idx="0">
+            <a:schemeClr val="dk1"/>
+          </a:fillRef>
+          <a:effectRef idx="0">
+            <a:schemeClr val="dk1"/>
+          </a:effectRef>
+          <a:fontRef idx="minor">
+            <a:schemeClr val="tx1"/>
+          </a:fontRef>
+        </p:style>
+      </p:cxnSp>
+      <p:cxnSp>
+        <p:nvCxnSpPr>
+          <p:cNvPr id="17" name="Straight Arrow Connector 16">
+            <a:extLst>
+              <a:ext uri="{FF2B5EF4-FFF2-40B4-BE49-F238E27FC236}">
+                <a16:creationId xmlns:a16="http://schemas.microsoft.com/office/drawing/2014/main" id="{EC8BFFAB-528E-4EBF-A5B4-AF36E79B1B01}"/>
+              </a:ext>
+            </a:extLst>
+          </p:cNvPr>
+          <p:cNvCxnSpPr>
+            <a:cxnSpLocks/>
+          </p:cNvCxnSpPr>
+          <p:nvPr/>
+        </p:nvCxnSpPr>
+        <p:spPr>
+          <a:xfrm>
+            <a:off x="3909272" y="3179427"/>
+            <a:ext cx="302001" cy="792760"/>
+          </a:xfrm>
+          <a:prstGeom prst="straightConnector1">
+            <a:avLst/>
+          </a:prstGeom>
+          <a:ln>
+            <a:tailEnd type="triangle"/>
+          </a:ln>
+        </p:spPr>
+        <p:style>
+          <a:lnRef idx="1">
+            <a:schemeClr val="dk1"/>
+          </a:lnRef>
+          <a:fillRef idx="0">
+            <a:schemeClr val="dk1"/>
+          </a:fillRef>
+          <a:effectRef idx="0">
+            <a:schemeClr val="dk1"/>
+          </a:effectRef>
+          <a:fontRef idx="minor">
+            <a:schemeClr val="tx1"/>
+          </a:fontRef>
+        </p:style>
+      </p:cxnSp>
+      <p:sp>
+        <p:nvSpPr>
+          <p:cNvPr id="21" name="Rectangle 20">
+            <a:extLst>
+              <a:ext uri="{FF2B5EF4-FFF2-40B4-BE49-F238E27FC236}">
+                <a16:creationId xmlns:a16="http://schemas.microsoft.com/office/drawing/2014/main" id="{F355B5F8-99C4-491A-90B8-43D945478D6E}"/>
+              </a:ext>
+            </a:extLst>
+          </p:cNvPr>
+          <p:cNvSpPr/>
+          <p:nvPr/>
+        </p:nvSpPr>
+        <p:spPr>
+          <a:xfrm>
+            <a:off x="165685" y="872454"/>
+            <a:ext cx="1879134" cy="1057013"/>
+          </a:xfrm>
+          <a:prstGeom prst="rect">
+            <a:avLst/>
+          </a:prstGeom>
+        </p:spPr>
+        <p:style>
+          <a:lnRef idx="2">
+            <a:schemeClr val="accent2">
+              <a:shade val="50000"/>
+            </a:schemeClr>
+          </a:lnRef>
+          <a:fillRef idx="1">
+            <a:schemeClr val="accent2"/>
+          </a:fillRef>
+          <a:effectRef idx="0">
+            <a:schemeClr val="accent2"/>
+          </a:effectRef>
+          <a:fontRef idx="minor">
+            <a:schemeClr val="lt1"/>
+          </a:fontRef>
+        </p:style>
+        <p:txBody>
+          <a:bodyPr rtlCol="0" anchor="ctr"/>
+          <a:lstStyle/>
+          <a:p>
+            <a:pPr algn="ctr"/>
+            <a:r>
+              <a:rPr lang="en-US" dirty="0"/>
+              <a:t>Drawable interface</a:t>
+            </a:r>
+          </a:p>
+        </p:txBody>
+      </p:sp>
+      <p:cxnSp>
+        <p:nvCxnSpPr>
+          <p:cNvPr id="23" name="Straight Arrow Connector 22">
+            <a:extLst>
+              <a:ext uri="{FF2B5EF4-FFF2-40B4-BE49-F238E27FC236}">
+                <a16:creationId xmlns:a16="http://schemas.microsoft.com/office/drawing/2014/main" id="{62DBD0C6-1271-4913-9C3C-0C4778D2C252}"/>
+              </a:ext>
+            </a:extLst>
+          </p:cNvPr>
+          <p:cNvCxnSpPr/>
+          <p:nvPr/>
+        </p:nvCxnSpPr>
+        <p:spPr>
+          <a:xfrm>
+            <a:off x="1384183" y="1971413"/>
+            <a:ext cx="947957" cy="411060"/>
+          </a:xfrm>
+          <a:prstGeom prst="straightConnector1">
+            <a:avLst/>
+          </a:prstGeom>
+          <a:ln>
+            <a:tailEnd type="triangle"/>
+          </a:ln>
+        </p:spPr>
+        <p:style>
+          <a:lnRef idx="1">
+            <a:schemeClr val="dk1"/>
+          </a:lnRef>
+          <a:fillRef idx="0">
+            <a:schemeClr val="dk1"/>
+          </a:fillRef>
+          <a:effectRef idx="0">
+            <a:schemeClr val="dk1"/>
+          </a:effectRef>
+          <a:fontRef idx="minor">
+            <a:schemeClr val="tx1"/>
+          </a:fontRef>
+        </p:style>
+      </p:cxnSp>
+      <p:sp>
+        <p:nvSpPr>
+          <p:cNvPr id="24" name="TextBox 23">
+            <a:extLst>
+              <a:ext uri="{FF2B5EF4-FFF2-40B4-BE49-F238E27FC236}">
+                <a16:creationId xmlns:a16="http://schemas.microsoft.com/office/drawing/2014/main" id="{D36B6509-285D-4BDA-AD28-36D2B86DC585}"/>
+              </a:ext>
+            </a:extLst>
+          </p:cNvPr>
+          <p:cNvSpPr txBox="1"/>
+          <p:nvPr/>
+        </p:nvSpPr>
+        <p:spPr>
+          <a:xfrm>
+            <a:off x="1052818" y="1971412"/>
+            <a:ext cx="1409350" cy="369332"/>
+          </a:xfrm>
+          <a:prstGeom prst="rect">
+            <a:avLst/>
+          </a:prstGeom>
+          <a:noFill/>
+        </p:spPr>
+        <p:txBody>
+          <a:bodyPr wrap="square" rtlCol="0">
+            <a:spAutoFit/>
+          </a:bodyPr>
+          <a:lstStyle/>
+          <a:p>
+            <a:r>
+              <a:rPr lang="en-US" dirty="0"/>
+              <a:t>implements</a:t>
+            </a:r>
+          </a:p>
+        </p:txBody>
+      </p:sp>
+    </p:spTree>
+    <p:extLst>
+      <p:ext uri="{BB962C8B-B14F-4D97-AF65-F5344CB8AC3E}">
+        <p14:creationId xmlns:p14="http://schemas.microsoft.com/office/powerpoint/2010/main" val="1992365206"/>
+      </p:ext>
+    </p:extLst>
+  </p:cSld>
+  <p:clrMapOvr>
+    <a:masterClrMapping/>
+  </p:clrMapOvr>
+</p:sld>
+</file>
+
 <file path=ppt/theme/theme1.xml><?xml version="1.0" encoding="utf-8"?>
 <a:theme xmlns:a="http://schemas.openxmlformats.org/drawingml/2006/main" name="Office Theme">
   <a:themeElements>

</xml_diff>